<commit_message>
Corrections rapport + modifs soutenance
</commit_message>
<xml_diff>
--- a/Soutenance_Stage.pptx
+++ b/Soutenance_Stage.pptx
@@ -5,7 +5,7 @@
     <p:sldMasterId id="2147483694" r:id="rId1"/>
   </p:sldMasterIdLst>
   <p:notesMasterIdLst>
-    <p:notesMasterId r:id="rId34"/>
+    <p:notesMasterId r:id="rId35"/>
   </p:notesMasterIdLst>
   <p:sldIdLst>
     <p:sldId id="256" r:id="rId2"/>
@@ -37,9 +37,10 @@
     <p:sldId id="335" r:id="rId28"/>
     <p:sldId id="333" r:id="rId29"/>
     <p:sldId id="332" r:id="rId30"/>
-    <p:sldId id="301" r:id="rId31"/>
-    <p:sldId id="302" r:id="rId32"/>
-    <p:sldId id="305" r:id="rId33"/>
+    <p:sldId id="336" r:id="rId31"/>
+    <p:sldId id="301" r:id="rId32"/>
+    <p:sldId id="302" r:id="rId33"/>
+    <p:sldId id="305" r:id="rId34"/>
   </p:sldIdLst>
   <p:sldSz cx="9144000" cy="6858000" type="screen4x3"/>
   <p:notesSz cx="6858000" cy="9144000"/>
@@ -228,7 +229,7 @@
           <a:p>
             <a:fld id="{6A6B8603-F168-4293-AE02-38B8D4407F2C}" type="datetimeFigureOut">
               <a:rPr lang="fr-FR" smtClean="0"/>
-              <a:t>22/05/2017</a:t>
+              <a:t>26/05/2017</a:t>
             </a:fld>
             <a:endParaRPr lang="fr-FR"/>
           </a:p>
@@ -624,7 +625,7 @@
           <a:p>
             <a:fld id="{C61A2356-E161-48C6-974A-E0A2B3A6E478}" type="datetime1">
               <a:rPr lang="fr-FR" smtClean="0"/>
-              <a:t>22/05/2017</a:t>
+              <a:t>26/05/2017</a:t>
             </a:fld>
             <a:endParaRPr lang="fr-FR"/>
           </a:p>
@@ -792,7 +793,7 @@
           <a:p>
             <a:fld id="{A48A7D4D-F8D9-43CD-9DB2-FDB2C5CB8AE3}" type="datetime1">
               <a:rPr lang="fr-FR" smtClean="0"/>
-              <a:t>22/05/2017</a:t>
+              <a:t>26/05/2017</a:t>
             </a:fld>
             <a:endParaRPr lang="fr-FR"/>
           </a:p>
@@ -970,7 +971,7 @@
           <a:p>
             <a:fld id="{82ABE3F5-26BA-4BFC-AFDC-3AC7FE105C9D}" type="datetime1">
               <a:rPr lang="fr-FR" smtClean="0"/>
-              <a:t>22/05/2017</a:t>
+              <a:t>26/05/2017</a:t>
             </a:fld>
             <a:endParaRPr lang="fr-FR"/>
           </a:p>
@@ -1138,7 +1139,7 @@
           <a:p>
             <a:fld id="{C711CD0E-760D-4202-B0C1-E7D5CF6BAA62}" type="datetime1">
               <a:rPr lang="fr-FR" smtClean="0"/>
-              <a:t>22/05/2017</a:t>
+              <a:t>26/05/2017</a:t>
             </a:fld>
             <a:endParaRPr lang="fr-FR"/>
           </a:p>
@@ -1383,7 +1384,7 @@
           <a:p>
             <a:fld id="{F704051D-05F2-4EFF-BAA5-5AA6BE41474E}" type="datetime1">
               <a:rPr lang="fr-FR" smtClean="0"/>
-              <a:t>22/05/2017</a:t>
+              <a:t>26/05/2017</a:t>
             </a:fld>
             <a:endParaRPr lang="fr-FR"/>
           </a:p>
@@ -1612,7 +1613,7 @@
           <a:p>
             <a:fld id="{5B1E51B9-3C08-47E2-B3DF-FAB5241977DC}" type="datetime1">
               <a:rPr lang="fr-FR" smtClean="0"/>
-              <a:t>22/05/2017</a:t>
+              <a:t>26/05/2017</a:t>
             </a:fld>
             <a:endParaRPr lang="fr-FR"/>
           </a:p>
@@ -1976,7 +1977,7 @@
           <a:p>
             <a:fld id="{A0C115EA-13E3-4C85-85DE-3CCFF6A9740B}" type="datetime1">
               <a:rPr lang="fr-FR" smtClean="0"/>
-              <a:t>22/05/2017</a:t>
+              <a:t>26/05/2017</a:t>
             </a:fld>
             <a:endParaRPr lang="fr-FR"/>
           </a:p>
@@ -2093,7 +2094,7 @@
           <a:p>
             <a:fld id="{68F67F48-8778-44AB-9E95-D19A6ABDAF43}" type="datetime1">
               <a:rPr lang="fr-FR" smtClean="0"/>
-              <a:t>22/05/2017</a:t>
+              <a:t>26/05/2017</a:t>
             </a:fld>
             <a:endParaRPr lang="fr-FR"/>
           </a:p>
@@ -2188,7 +2189,7 @@
           <a:p>
             <a:fld id="{663C7F81-61AA-4D25-8AB3-DE0D31697BD5}" type="datetime1">
               <a:rPr lang="fr-FR" smtClean="0"/>
-              <a:t>22/05/2017</a:t>
+              <a:t>26/05/2017</a:t>
             </a:fld>
             <a:endParaRPr lang="fr-FR"/>
           </a:p>
@@ -2463,7 +2464,7 @@
           <a:p>
             <a:fld id="{14CB0180-EC6F-44E5-B856-8B0D40ADA19F}" type="datetime1">
               <a:rPr lang="fr-FR" smtClean="0"/>
-              <a:t>22/05/2017</a:t>
+              <a:t>26/05/2017</a:t>
             </a:fld>
             <a:endParaRPr lang="fr-FR"/>
           </a:p>
@@ -2715,7 +2716,7 @@
           <a:p>
             <a:fld id="{BC5DA1EF-175C-4684-858C-4DA625CE5717}" type="datetime1">
               <a:rPr lang="fr-FR" smtClean="0"/>
-              <a:t>22/05/2017</a:t>
+              <a:t>26/05/2017</a:t>
             </a:fld>
             <a:endParaRPr lang="fr-FR"/>
           </a:p>
@@ -2935,7 +2936,7 @@
           <a:p>
             <a:fld id="{E7E6C54A-DA3B-4E4A-92D2-3E89B5E318E2}" type="datetime1">
               <a:rPr lang="fr-FR" smtClean="0"/>
-              <a:t>22/05/2017</a:t>
+              <a:t>26/05/2017</a:t>
             </a:fld>
             <a:endParaRPr lang="fr-FR"/>
           </a:p>
@@ -3353,7 +3354,7 @@
         </p:nvSpPr>
         <p:spPr>
           <a:xfrm>
-            <a:off x="0" y="1811318"/>
+            <a:off x="0" y="1746868"/>
             <a:ext cx="9144000" cy="1646302"/>
           </a:xfrm>
         </p:spPr>
@@ -3422,7 +3423,7 @@
         <p:spPr>
           <a:xfrm>
             <a:off x="277661" y="234648"/>
-            <a:ext cx="2710927" cy="892552"/>
+            <a:ext cx="2710927" cy="954107"/>
           </a:xfrm>
           <a:prstGeom prst="rect">
             <a:avLst/>
@@ -3436,7 +3437,7 @@
           <a:lstStyle/>
           <a:p>
             <a:r>
-              <a:rPr lang="fr-FR" sz="2600" dirty="0">
+              <a:rPr lang="fr-FR" sz="2800" dirty="0">
                 <a:solidFill>
                   <a:schemeClr val="bg1"/>
                 </a:solidFill>
@@ -3448,7 +3449,7 @@
           </a:p>
           <a:p>
             <a:r>
-              <a:rPr lang="fr-FR" sz="2600" dirty="0">
+              <a:rPr lang="fr-FR" sz="2800" dirty="0">
                 <a:solidFill>
                   <a:schemeClr val="bg1"/>
                 </a:solidFill>
@@ -3534,7 +3535,7 @@
         <p:spPr>
           <a:xfrm>
             <a:off x="0" y="1641196"/>
-            <a:ext cx="9144000" cy="584775"/>
+            <a:ext cx="9144000" cy="646331"/>
           </a:xfrm>
           <a:prstGeom prst="rect">
             <a:avLst/>
@@ -3549,7 +3550,7 @@
           <a:p>
             <a:pPr algn="ctr"/>
             <a:r>
-              <a:rPr lang="fr-FR" sz="1600" dirty="0">
+              <a:rPr lang="fr-FR" dirty="0">
                 <a:solidFill>
                   <a:srgbClr val="005DC4"/>
                 </a:solidFill>
@@ -3562,7 +3563,7 @@
           <a:p>
             <a:pPr algn="ctr"/>
             <a:r>
-              <a:rPr lang="fr-FR" sz="1600" dirty="0">
+              <a:rPr lang="fr-FR" dirty="0">
                 <a:solidFill>
                   <a:srgbClr val="005DC4"/>
                 </a:solidFill>
@@ -8635,7 +8636,7 @@
         </p:nvSpPr>
         <p:spPr>
           <a:xfrm>
-            <a:off x="896787" y="2102126"/>
+            <a:off x="919090" y="2090974"/>
             <a:ext cx="7886700" cy="4351338"/>
           </a:xfrm>
         </p:spPr>
@@ -15216,7 +15217,7 @@
         </p:nvSpPr>
         <p:spPr>
           <a:xfrm>
-            <a:off x="245917" y="10391"/>
+            <a:off x="245917" y="0"/>
             <a:ext cx="6347713" cy="1320800"/>
           </a:xfrm>
         </p:spPr>
@@ -15231,16 +15232,16 @@
                 <a:solidFill>
                   <a:schemeClr val="bg1"/>
                 </a:solidFill>
-                <a:latin typeface="Eurostile" panose="020B0504020202050204" pitchFamily="34" charset="0"/>
-              </a:rPr>
-              <a:t>Bilan humain et</a:t>
+                <a:latin typeface="Eurostile-Roman" pitchFamily="2" charset="0"/>
+              </a:rPr>
+              <a:t>Développement </a:t>
             </a:r>
             <a:br>
               <a:rPr lang="fr-FR" sz="3500" dirty="0">
                 <a:solidFill>
                   <a:schemeClr val="bg1"/>
                 </a:solidFill>
-                <a:latin typeface="Eurostile" panose="020B0504020202050204" pitchFamily="34" charset="0"/>
+                <a:latin typeface="Eurostile-Roman" pitchFamily="2" charset="0"/>
               </a:rPr>
             </a:br>
             <a:r>
@@ -15248,16 +15249,54 @@
                 <a:solidFill>
                   <a:schemeClr val="bg1"/>
                 </a:solidFill>
-                <a:latin typeface="Eurostile" panose="020B0504020202050204" pitchFamily="34" charset="0"/>
-              </a:rPr>
-              <a:t>technique</a:t>
+                <a:latin typeface="Eurostile-Roman" pitchFamily="2" charset="0"/>
+              </a:rPr>
+              <a:t>de la solution</a:t>
             </a:r>
           </a:p>
         </p:txBody>
       </p:sp>
       <p:sp>
         <p:nvSpPr>
-          <p:cNvPr id="5" name="Espace réservé du contenu 30"/>
+          <p:cNvPr id="11" name="Espace réservé du numéro de diapositive 1"/>
+          <p:cNvSpPr>
+            <a:spLocks noGrp="1"/>
+          </p:cNvSpPr>
+          <p:nvPr>
+            <p:ph type="sldNum" sz="quarter" idx="12"/>
+          </p:nvPr>
+        </p:nvSpPr>
+        <p:spPr>
+          <a:xfrm>
+            <a:off x="6603423" y="6255991"/>
+            <a:ext cx="2057400" cy="365125"/>
+          </a:xfrm>
+        </p:spPr>
+        <p:txBody>
+          <a:bodyPr/>
+          <a:lstStyle/>
+          <a:p>
+            <a:r>
+              <a:rPr lang="fr-FR" sz="1800" dirty="0">
+                <a:latin typeface="Eurostile-Roman" pitchFamily="2" charset="0"/>
+              </a:rPr>
+              <a:t>Diapositive </a:t>
+            </a:r>
+            <a:fld id="{0A0AF257-D28F-495E-9E53-3BED59B8AA35}" type="slidenum">
+              <a:rPr lang="fr-FR" sz="1800" smtClean="0">
+                <a:latin typeface="Eurostile-Roman" pitchFamily="2" charset="0"/>
+              </a:rPr>
+              <a:t>30</a:t>
+            </a:fld>
+            <a:endParaRPr lang="fr-FR" sz="1800" dirty="0">
+              <a:latin typeface="Eurostile-Roman" pitchFamily="2" charset="0"/>
+            </a:endParaRPr>
+          </a:p>
+        </p:txBody>
+      </p:sp>
+      <p:sp>
+        <p:nvSpPr>
+          <p:cNvPr id="7" name="Espace réservé du contenu 30"/>
           <p:cNvSpPr txBox="1">
             <a:spLocks/>
           </p:cNvSpPr>
@@ -15265,8 +15304,8 @@
         </p:nvSpPr>
         <p:spPr>
           <a:xfrm>
-            <a:off x="1483301" y="2039055"/>
-            <a:ext cx="8359485" cy="3862981"/>
+            <a:off x="906036" y="2784963"/>
+            <a:ext cx="8059882" cy="3258112"/>
           </a:xfrm>
           <a:prstGeom prst="rect">
             <a:avLst/>
@@ -15441,7 +15480,7 @@
             </a:lvl9pPr>
           </a:lstStyle>
           <a:p>
-            <a:pPr>
+            <a:pPr lvl="1">
               <a:lnSpc>
                 <a:spcPct val="250000"/>
               </a:lnSpc>
@@ -15449,117 +15488,586 @@
               <a:buChar char="§"/>
             </a:pPr>
             <a:r>
-              <a:rPr lang="fr-FR" sz="2200" dirty="0">
+              <a:rPr lang="fr-FR" sz="2000" dirty="0">
                 <a:solidFill>
                   <a:srgbClr val="004492"/>
                 </a:solidFill>
-                <a:latin typeface="Eurostile" panose="020B0504020202050204" pitchFamily="34" charset="0"/>
-              </a:rPr>
-              <a:t> Expérience très enrichissante et motivante</a:t>
-            </a:r>
-          </a:p>
-          <a:p>
-            <a:pPr>
+                <a:latin typeface="Calibri (Corps)"/>
+              </a:rPr>
+              <a:t>Documents techniques d’</a:t>
+            </a:r>
+            <a:r>
+              <a:rPr lang="fr-FR" sz="2000" dirty="0" err="1">
+                <a:solidFill>
+                  <a:srgbClr val="004492"/>
+                </a:solidFill>
+                <a:latin typeface="Calibri (Corps)"/>
+              </a:rPr>
+              <a:t>Eskape</a:t>
+            </a:r>
+            <a:r>
+              <a:rPr lang="fr-FR" sz="2000" dirty="0">
+                <a:solidFill>
+                  <a:srgbClr val="004492"/>
+                </a:solidFill>
+                <a:latin typeface="Calibri (Corps)"/>
+              </a:rPr>
+              <a:t> </a:t>
+            </a:r>
+            <a:r>
+              <a:rPr lang="fr-FR" sz="2000" dirty="0">
+                <a:solidFill>
+                  <a:srgbClr val="004492"/>
+                </a:solidFill>
+                <a:latin typeface="Calibri (Corps)"/>
+                <a:sym typeface="Wingdings" panose="05000000000000000000" pitchFamily="2" charset="2"/>
+              </a:rPr>
+              <a:t> besoins d’entreprise :</a:t>
+            </a:r>
+            <a:endParaRPr lang="fr-FR" sz="2000" dirty="0">
+              <a:solidFill>
+                <a:srgbClr val="004492"/>
+              </a:solidFill>
+              <a:latin typeface="Calibri (Corps)"/>
+            </a:endParaRPr>
+          </a:p>
+          <a:p>
+            <a:pPr lvl="2">
+              <a:lnSpc>
+                <a:spcPct val="250000"/>
+              </a:lnSpc>
+              <a:buFont typeface="Wingdings" panose="05000000000000000000" pitchFamily="2" charset="2"/>
+              <a:buChar char="q"/>
+            </a:pPr>
+            <a:r>
+              <a:rPr lang="fr-FR" sz="1900" dirty="0">
+                <a:solidFill>
+                  <a:srgbClr val="004492"/>
+                </a:solidFill>
+                <a:latin typeface="Calibri (Corps)"/>
+              </a:rPr>
+              <a:t> Développement C/AL spécifiques sous Dynamics </a:t>
+            </a:r>
+            <a:r>
+              <a:rPr lang="fr-FR" sz="1900" dirty="0" err="1">
+                <a:solidFill>
+                  <a:srgbClr val="004492"/>
+                </a:solidFill>
+                <a:latin typeface="Calibri (Corps)"/>
+              </a:rPr>
+              <a:t>Nav</a:t>
+            </a:r>
+            <a:endParaRPr lang="fr-FR" sz="1900" dirty="0">
+              <a:solidFill>
+                <a:srgbClr val="004492"/>
+              </a:solidFill>
+              <a:latin typeface="Calibri (Corps)"/>
+            </a:endParaRPr>
+          </a:p>
+          <a:p>
+            <a:pPr lvl="2">
+              <a:lnSpc>
+                <a:spcPct val="250000"/>
+              </a:lnSpc>
+              <a:buFont typeface="Wingdings" panose="05000000000000000000" pitchFamily="2" charset="2"/>
+              <a:buChar char="q"/>
+            </a:pPr>
+            <a:r>
+              <a:rPr lang="fr-FR" sz="1900" b="1" dirty="0">
+                <a:solidFill>
+                  <a:srgbClr val="004492"/>
+                </a:solidFill>
+                <a:latin typeface="Calibri (Corps)"/>
+              </a:rPr>
+              <a:t> </a:t>
+            </a:r>
+            <a:r>
+              <a:rPr lang="fr-FR" sz="1900" dirty="0">
+                <a:solidFill>
+                  <a:srgbClr val="004492"/>
+                </a:solidFill>
+                <a:latin typeface="Calibri (Corps)"/>
+              </a:rPr>
+              <a:t>Développement C# sur des PSM : </a:t>
+            </a:r>
+            <a:endParaRPr lang="fr-FR" sz="1900" b="1" dirty="0">
+              <a:solidFill>
+                <a:srgbClr val="004492"/>
+              </a:solidFill>
+              <a:latin typeface="Calibri (Corps)"/>
+            </a:endParaRPr>
+          </a:p>
+          <a:p>
+            <a:pPr lvl="1">
               <a:lnSpc>
                 <a:spcPct val="250000"/>
               </a:lnSpc>
               <a:buFont typeface="Wingdings" panose="05000000000000000000" pitchFamily="2" charset="2"/>
               <a:buChar char="§"/>
             </a:pPr>
-            <a:r>
-              <a:rPr lang="fr-FR" sz="2200" dirty="0">
-                <a:solidFill>
-                  <a:srgbClr val="004492"/>
-                </a:solidFill>
-                <a:latin typeface="Eurostile" panose="020B0504020202050204" pitchFamily="34" charset="0"/>
-              </a:rPr>
-              <a:t> Projet à la fois technique, complet et intéressant</a:t>
-            </a:r>
-          </a:p>
-          <a:p>
-            <a:pPr>
-              <a:lnSpc>
-                <a:spcPct val="250000"/>
-              </a:lnSpc>
-              <a:buFont typeface="Wingdings" panose="05000000000000000000" pitchFamily="2" charset="2"/>
-              <a:buChar char="§"/>
-            </a:pPr>
-            <a:r>
-              <a:rPr lang="fr-FR" sz="2200" dirty="0">
-                <a:solidFill>
-                  <a:srgbClr val="004492"/>
-                </a:solidFill>
-                <a:latin typeface="Eurostile" panose="020B0504020202050204" pitchFamily="34" charset="0"/>
-                <a:sym typeface="Wingdings" panose="05000000000000000000" pitchFamily="2" charset="2"/>
-              </a:rPr>
-              <a:t> Mise en place des compétences acquises à l’</a:t>
-            </a:r>
-            <a:r>
-              <a:rPr lang="fr-FR" sz="2200" dirty="0" err="1">
-                <a:solidFill>
-                  <a:srgbClr val="004492"/>
-                </a:solidFill>
-                <a:latin typeface="Eurostile" panose="020B0504020202050204" pitchFamily="34" charset="0"/>
-                <a:sym typeface="Wingdings" panose="05000000000000000000" pitchFamily="2" charset="2"/>
-              </a:rPr>
-              <a:t>lUT</a:t>
-            </a:r>
-            <a:endParaRPr lang="fr-FR" sz="2200" dirty="0">
+            <a:endParaRPr lang="fr-FR" sz="2000" b="1" dirty="0">
               <a:solidFill>
                 <a:srgbClr val="004492"/>
               </a:solidFill>
-              <a:latin typeface="Eurostile" panose="020B0504020202050204" pitchFamily="34" charset="0"/>
-              <a:sym typeface="Wingdings" panose="05000000000000000000" pitchFamily="2" charset="2"/>
+              <a:latin typeface="Calibri (Corps)"/>
             </a:endParaRPr>
           </a:p>
           <a:p>
-            <a:pPr>
+            <a:pPr lvl="1">
               <a:lnSpc>
                 <a:spcPct val="250000"/>
               </a:lnSpc>
-              <a:buFont typeface="Wingdings" panose="05000000000000000000" pitchFamily="2" charset="2"/>
-              <a:buChar char="§"/>
             </a:pPr>
-            <a:r>
-              <a:rPr lang="fr-FR" sz="2200" dirty="0">
-                <a:solidFill>
-                  <a:srgbClr val="004492"/>
-                </a:solidFill>
-                <a:latin typeface="Eurostile" panose="020B0504020202050204" pitchFamily="34" charset="0"/>
-                <a:sym typeface="Wingdings" panose="05000000000000000000" pitchFamily="2" charset="2"/>
-              </a:rPr>
-              <a:t> Découverte de technologies spécifiques </a:t>
-            </a:r>
+            <a:endParaRPr lang="fr-FR" sz="2000" dirty="0">
+              <a:solidFill>
+                <a:srgbClr val="004492"/>
+              </a:solidFill>
+              <a:latin typeface="Calibri (Corps)"/>
+            </a:endParaRPr>
           </a:p>
         </p:txBody>
       </p:sp>
       <p:sp>
         <p:nvSpPr>
-          <p:cNvPr id="3" name="Espace réservé du numéro de diapositive 2"/>
-          <p:cNvSpPr>
-            <a:spLocks noGrp="1"/>
+          <p:cNvPr id="9" name="Espace réservé du contenu 30"/>
+          <p:cNvSpPr txBox="1">
+            <a:spLocks/>
           </p:cNvSpPr>
-          <p:nvPr>
-            <p:ph type="sldNum" sz="quarter" idx="12"/>
-          </p:nvPr>
+          <p:nvPr/>
         </p:nvSpPr>
-        <p:spPr/>
+        <p:spPr>
+          <a:xfrm>
+            <a:off x="906036" y="2257982"/>
+            <a:ext cx="7886700" cy="1053962"/>
+          </a:xfrm>
+          <a:prstGeom prst="rect">
+            <a:avLst/>
+          </a:prstGeom>
+        </p:spPr>
         <p:txBody>
-          <a:bodyPr/>
-          <a:lstStyle/>
-          <a:p>
-            <a:fld id="{0A0AF257-D28F-495E-9E53-3BED59B8AA35}" type="slidenum">
-              <a:rPr lang="fr-FR" smtClean="0"/>
-              <a:t>30</a:t>
-            </a:fld>
-            <a:endParaRPr lang="fr-FR"/>
+          <a:bodyPr vert="horz" lIns="91440" tIns="45720" rIns="91440" bIns="45720" rtlCol="0">
+            <a:normAutofit/>
+          </a:bodyPr>
+          <a:lstStyle>
+            <a:lvl1pPr marL="171450" indent="-171450" algn="l" defTabSz="685800" rtl="0" eaLnBrk="1" latinLnBrk="0" hangingPunct="1">
+              <a:lnSpc>
+                <a:spcPct val="90000"/>
+              </a:lnSpc>
+              <a:spcBef>
+                <a:spcPts val="750"/>
+              </a:spcBef>
+              <a:buFont typeface="Arial" panose="020B0604020202020204" pitchFamily="34" charset="0"/>
+              <a:buChar char="•"/>
+              <a:defRPr sz="2100" kern="1200">
+                <a:solidFill>
+                  <a:schemeClr val="tx1"/>
+                </a:solidFill>
+                <a:latin typeface="+mn-lt"/>
+                <a:ea typeface="+mn-ea"/>
+                <a:cs typeface="+mn-cs"/>
+              </a:defRPr>
+            </a:lvl1pPr>
+            <a:lvl2pPr marL="514350" indent="-171450" algn="l" defTabSz="685800" rtl="0" eaLnBrk="1" latinLnBrk="0" hangingPunct="1">
+              <a:lnSpc>
+                <a:spcPct val="90000"/>
+              </a:lnSpc>
+              <a:spcBef>
+                <a:spcPts val="375"/>
+              </a:spcBef>
+              <a:buFont typeface="Arial" panose="020B0604020202020204" pitchFamily="34" charset="0"/>
+              <a:buChar char="•"/>
+              <a:defRPr sz="1800" kern="1200">
+                <a:solidFill>
+                  <a:schemeClr val="tx1"/>
+                </a:solidFill>
+                <a:latin typeface="+mn-lt"/>
+                <a:ea typeface="+mn-ea"/>
+                <a:cs typeface="+mn-cs"/>
+              </a:defRPr>
+            </a:lvl2pPr>
+            <a:lvl3pPr marL="857250" indent="-171450" algn="l" defTabSz="685800" rtl="0" eaLnBrk="1" latinLnBrk="0" hangingPunct="1">
+              <a:lnSpc>
+                <a:spcPct val="90000"/>
+              </a:lnSpc>
+              <a:spcBef>
+                <a:spcPts val="375"/>
+              </a:spcBef>
+              <a:buFont typeface="Arial" panose="020B0604020202020204" pitchFamily="34" charset="0"/>
+              <a:buChar char="•"/>
+              <a:defRPr sz="1500" kern="1200">
+                <a:solidFill>
+                  <a:schemeClr val="tx1"/>
+                </a:solidFill>
+                <a:latin typeface="+mn-lt"/>
+                <a:ea typeface="+mn-ea"/>
+                <a:cs typeface="+mn-cs"/>
+              </a:defRPr>
+            </a:lvl3pPr>
+            <a:lvl4pPr marL="1200150" indent="-171450" algn="l" defTabSz="685800" rtl="0" eaLnBrk="1" latinLnBrk="0" hangingPunct="1">
+              <a:lnSpc>
+                <a:spcPct val="90000"/>
+              </a:lnSpc>
+              <a:spcBef>
+                <a:spcPts val="375"/>
+              </a:spcBef>
+              <a:buFont typeface="Arial" panose="020B0604020202020204" pitchFamily="34" charset="0"/>
+              <a:buChar char="•"/>
+              <a:defRPr sz="1350" kern="1200">
+                <a:solidFill>
+                  <a:schemeClr val="tx1"/>
+                </a:solidFill>
+                <a:latin typeface="+mn-lt"/>
+                <a:ea typeface="+mn-ea"/>
+                <a:cs typeface="+mn-cs"/>
+              </a:defRPr>
+            </a:lvl4pPr>
+            <a:lvl5pPr marL="1543050" indent="-171450" algn="l" defTabSz="685800" rtl="0" eaLnBrk="1" latinLnBrk="0" hangingPunct="1">
+              <a:lnSpc>
+                <a:spcPct val="90000"/>
+              </a:lnSpc>
+              <a:spcBef>
+                <a:spcPts val="375"/>
+              </a:spcBef>
+              <a:buFont typeface="Arial" panose="020B0604020202020204" pitchFamily="34" charset="0"/>
+              <a:buChar char="•"/>
+              <a:defRPr sz="1350" kern="1200">
+                <a:solidFill>
+                  <a:schemeClr val="tx1"/>
+                </a:solidFill>
+                <a:latin typeface="+mn-lt"/>
+                <a:ea typeface="+mn-ea"/>
+                <a:cs typeface="+mn-cs"/>
+              </a:defRPr>
+            </a:lvl5pPr>
+            <a:lvl6pPr marL="1885950" indent="-171450" algn="l" defTabSz="685800" rtl="0" eaLnBrk="1" latinLnBrk="0" hangingPunct="1">
+              <a:lnSpc>
+                <a:spcPct val="90000"/>
+              </a:lnSpc>
+              <a:spcBef>
+                <a:spcPts val="375"/>
+              </a:spcBef>
+              <a:buFont typeface="Arial" panose="020B0604020202020204" pitchFamily="34" charset="0"/>
+              <a:buChar char="•"/>
+              <a:defRPr sz="1350" kern="1200">
+                <a:solidFill>
+                  <a:schemeClr val="tx1"/>
+                </a:solidFill>
+                <a:latin typeface="+mn-lt"/>
+                <a:ea typeface="+mn-ea"/>
+                <a:cs typeface="+mn-cs"/>
+              </a:defRPr>
+            </a:lvl6pPr>
+            <a:lvl7pPr marL="2228850" indent="-171450" algn="l" defTabSz="685800" rtl="0" eaLnBrk="1" latinLnBrk="0" hangingPunct="1">
+              <a:lnSpc>
+                <a:spcPct val="90000"/>
+              </a:lnSpc>
+              <a:spcBef>
+                <a:spcPts val="375"/>
+              </a:spcBef>
+              <a:buFont typeface="Arial" panose="020B0604020202020204" pitchFamily="34" charset="0"/>
+              <a:buChar char="•"/>
+              <a:defRPr sz="1350" kern="1200">
+                <a:solidFill>
+                  <a:schemeClr val="tx1"/>
+                </a:solidFill>
+                <a:latin typeface="+mn-lt"/>
+                <a:ea typeface="+mn-ea"/>
+                <a:cs typeface="+mn-cs"/>
+              </a:defRPr>
+            </a:lvl7pPr>
+            <a:lvl8pPr marL="2571750" indent="-171450" algn="l" defTabSz="685800" rtl="0" eaLnBrk="1" latinLnBrk="0" hangingPunct="1">
+              <a:lnSpc>
+                <a:spcPct val="90000"/>
+              </a:lnSpc>
+              <a:spcBef>
+                <a:spcPts val="375"/>
+              </a:spcBef>
+              <a:buFont typeface="Arial" panose="020B0604020202020204" pitchFamily="34" charset="0"/>
+              <a:buChar char="•"/>
+              <a:defRPr sz="1350" kern="1200">
+                <a:solidFill>
+                  <a:schemeClr val="tx1"/>
+                </a:solidFill>
+                <a:latin typeface="+mn-lt"/>
+                <a:ea typeface="+mn-ea"/>
+                <a:cs typeface="+mn-cs"/>
+              </a:defRPr>
+            </a:lvl8pPr>
+            <a:lvl9pPr marL="2914650" indent="-171450" algn="l" defTabSz="685800" rtl="0" eaLnBrk="1" latinLnBrk="0" hangingPunct="1">
+              <a:lnSpc>
+                <a:spcPct val="90000"/>
+              </a:lnSpc>
+              <a:spcBef>
+                <a:spcPts val="375"/>
+              </a:spcBef>
+              <a:buFont typeface="Arial" panose="020B0604020202020204" pitchFamily="34" charset="0"/>
+              <a:buChar char="•"/>
+              <a:defRPr sz="1350" kern="1200">
+                <a:solidFill>
+                  <a:schemeClr val="tx1"/>
+                </a:solidFill>
+                <a:latin typeface="+mn-lt"/>
+                <a:ea typeface="+mn-ea"/>
+                <a:cs typeface="+mn-cs"/>
+              </a:defRPr>
+            </a:lvl9pPr>
+          </a:lstStyle>
+          <a:p>
+            <a:pPr>
+              <a:lnSpc>
+                <a:spcPct val="150000"/>
+              </a:lnSpc>
+            </a:pPr>
+            <a:r>
+              <a:rPr lang="fr-FR" sz="2200" dirty="0">
+                <a:solidFill>
+                  <a:srgbClr val="004492"/>
+                </a:solidFill>
+                <a:latin typeface="Calibri (Corps)"/>
+              </a:rPr>
+              <a:t>Travail sur des « fiches d’écarts » :</a:t>
+            </a:r>
           </a:p>
         </p:txBody>
       </p:sp>
+      <p:sp>
+        <p:nvSpPr>
+          <p:cNvPr id="8" name="Espace réservé du contenu 30"/>
+          <p:cNvSpPr txBox="1">
+            <a:spLocks/>
+          </p:cNvSpPr>
+          <p:nvPr/>
+        </p:nvSpPr>
+        <p:spPr>
+          <a:xfrm>
+            <a:off x="2767614" y="1320800"/>
+            <a:ext cx="4569212" cy="1053962"/>
+          </a:xfrm>
+          <a:prstGeom prst="rect">
+            <a:avLst/>
+          </a:prstGeom>
+        </p:spPr>
+        <p:txBody>
+          <a:bodyPr vert="horz" lIns="91440" tIns="45720" rIns="91440" bIns="45720" rtlCol="0">
+            <a:normAutofit/>
+          </a:bodyPr>
+          <a:lstStyle>
+            <a:lvl1pPr marL="171450" indent="-171450" algn="l" defTabSz="685800" rtl="0" eaLnBrk="1" latinLnBrk="0" hangingPunct="1">
+              <a:lnSpc>
+                <a:spcPct val="90000"/>
+              </a:lnSpc>
+              <a:spcBef>
+                <a:spcPts val="750"/>
+              </a:spcBef>
+              <a:buFont typeface="Arial" panose="020B0604020202020204" pitchFamily="34" charset="0"/>
+              <a:buChar char="•"/>
+              <a:defRPr sz="2100" kern="1200">
+                <a:solidFill>
+                  <a:schemeClr val="tx1"/>
+                </a:solidFill>
+                <a:latin typeface="+mn-lt"/>
+                <a:ea typeface="+mn-ea"/>
+                <a:cs typeface="+mn-cs"/>
+              </a:defRPr>
+            </a:lvl1pPr>
+            <a:lvl2pPr marL="514350" indent="-171450" algn="l" defTabSz="685800" rtl="0" eaLnBrk="1" latinLnBrk="0" hangingPunct="1">
+              <a:lnSpc>
+                <a:spcPct val="90000"/>
+              </a:lnSpc>
+              <a:spcBef>
+                <a:spcPts val="375"/>
+              </a:spcBef>
+              <a:buFont typeface="Arial" panose="020B0604020202020204" pitchFamily="34" charset="0"/>
+              <a:buChar char="•"/>
+              <a:defRPr sz="1800" kern="1200">
+                <a:solidFill>
+                  <a:schemeClr val="tx1"/>
+                </a:solidFill>
+                <a:latin typeface="+mn-lt"/>
+                <a:ea typeface="+mn-ea"/>
+                <a:cs typeface="+mn-cs"/>
+              </a:defRPr>
+            </a:lvl2pPr>
+            <a:lvl3pPr marL="857250" indent="-171450" algn="l" defTabSz="685800" rtl="0" eaLnBrk="1" latinLnBrk="0" hangingPunct="1">
+              <a:lnSpc>
+                <a:spcPct val="90000"/>
+              </a:lnSpc>
+              <a:spcBef>
+                <a:spcPts val="375"/>
+              </a:spcBef>
+              <a:buFont typeface="Arial" panose="020B0604020202020204" pitchFamily="34" charset="0"/>
+              <a:buChar char="•"/>
+              <a:defRPr sz="1500" kern="1200">
+                <a:solidFill>
+                  <a:schemeClr val="tx1"/>
+                </a:solidFill>
+                <a:latin typeface="+mn-lt"/>
+                <a:ea typeface="+mn-ea"/>
+                <a:cs typeface="+mn-cs"/>
+              </a:defRPr>
+            </a:lvl3pPr>
+            <a:lvl4pPr marL="1200150" indent="-171450" algn="l" defTabSz="685800" rtl="0" eaLnBrk="1" latinLnBrk="0" hangingPunct="1">
+              <a:lnSpc>
+                <a:spcPct val="90000"/>
+              </a:lnSpc>
+              <a:spcBef>
+                <a:spcPts val="375"/>
+              </a:spcBef>
+              <a:buFont typeface="Arial" panose="020B0604020202020204" pitchFamily="34" charset="0"/>
+              <a:buChar char="•"/>
+              <a:defRPr sz="1350" kern="1200">
+                <a:solidFill>
+                  <a:schemeClr val="tx1"/>
+                </a:solidFill>
+                <a:latin typeface="+mn-lt"/>
+                <a:ea typeface="+mn-ea"/>
+                <a:cs typeface="+mn-cs"/>
+              </a:defRPr>
+            </a:lvl4pPr>
+            <a:lvl5pPr marL="1543050" indent="-171450" algn="l" defTabSz="685800" rtl="0" eaLnBrk="1" latinLnBrk="0" hangingPunct="1">
+              <a:lnSpc>
+                <a:spcPct val="90000"/>
+              </a:lnSpc>
+              <a:spcBef>
+                <a:spcPts val="375"/>
+              </a:spcBef>
+              <a:buFont typeface="Arial" panose="020B0604020202020204" pitchFamily="34" charset="0"/>
+              <a:buChar char="•"/>
+              <a:defRPr sz="1350" kern="1200">
+                <a:solidFill>
+                  <a:schemeClr val="tx1"/>
+                </a:solidFill>
+                <a:latin typeface="+mn-lt"/>
+                <a:ea typeface="+mn-ea"/>
+                <a:cs typeface="+mn-cs"/>
+              </a:defRPr>
+            </a:lvl5pPr>
+            <a:lvl6pPr marL="1885950" indent="-171450" algn="l" defTabSz="685800" rtl="0" eaLnBrk="1" latinLnBrk="0" hangingPunct="1">
+              <a:lnSpc>
+                <a:spcPct val="90000"/>
+              </a:lnSpc>
+              <a:spcBef>
+                <a:spcPts val="375"/>
+              </a:spcBef>
+              <a:buFont typeface="Arial" panose="020B0604020202020204" pitchFamily="34" charset="0"/>
+              <a:buChar char="•"/>
+              <a:defRPr sz="1350" kern="1200">
+                <a:solidFill>
+                  <a:schemeClr val="tx1"/>
+                </a:solidFill>
+                <a:latin typeface="+mn-lt"/>
+                <a:ea typeface="+mn-ea"/>
+                <a:cs typeface="+mn-cs"/>
+              </a:defRPr>
+            </a:lvl6pPr>
+            <a:lvl7pPr marL="2228850" indent="-171450" algn="l" defTabSz="685800" rtl="0" eaLnBrk="1" latinLnBrk="0" hangingPunct="1">
+              <a:lnSpc>
+                <a:spcPct val="90000"/>
+              </a:lnSpc>
+              <a:spcBef>
+                <a:spcPts val="375"/>
+              </a:spcBef>
+              <a:buFont typeface="Arial" panose="020B0604020202020204" pitchFamily="34" charset="0"/>
+              <a:buChar char="•"/>
+              <a:defRPr sz="1350" kern="1200">
+                <a:solidFill>
+                  <a:schemeClr val="tx1"/>
+                </a:solidFill>
+                <a:latin typeface="+mn-lt"/>
+                <a:ea typeface="+mn-ea"/>
+                <a:cs typeface="+mn-cs"/>
+              </a:defRPr>
+            </a:lvl7pPr>
+            <a:lvl8pPr marL="2571750" indent="-171450" algn="l" defTabSz="685800" rtl="0" eaLnBrk="1" latinLnBrk="0" hangingPunct="1">
+              <a:lnSpc>
+                <a:spcPct val="90000"/>
+              </a:lnSpc>
+              <a:spcBef>
+                <a:spcPts val="375"/>
+              </a:spcBef>
+              <a:buFont typeface="Arial" panose="020B0604020202020204" pitchFamily="34" charset="0"/>
+              <a:buChar char="•"/>
+              <a:defRPr sz="1350" kern="1200">
+                <a:solidFill>
+                  <a:schemeClr val="tx1"/>
+                </a:solidFill>
+                <a:latin typeface="+mn-lt"/>
+                <a:ea typeface="+mn-ea"/>
+                <a:cs typeface="+mn-cs"/>
+              </a:defRPr>
+            </a:lvl8pPr>
+            <a:lvl9pPr marL="2914650" indent="-171450" algn="l" defTabSz="685800" rtl="0" eaLnBrk="1" latinLnBrk="0" hangingPunct="1">
+              <a:lnSpc>
+                <a:spcPct val="90000"/>
+              </a:lnSpc>
+              <a:spcBef>
+                <a:spcPts val="375"/>
+              </a:spcBef>
+              <a:buFont typeface="Arial" panose="020B0604020202020204" pitchFamily="34" charset="0"/>
+              <a:buChar char="•"/>
+              <a:defRPr sz="1350" kern="1200">
+                <a:solidFill>
+                  <a:schemeClr val="tx1"/>
+                </a:solidFill>
+                <a:latin typeface="+mn-lt"/>
+                <a:ea typeface="+mn-ea"/>
+                <a:cs typeface="+mn-cs"/>
+              </a:defRPr>
+            </a:lvl9pPr>
+          </a:lstStyle>
+          <a:p>
+            <a:pPr marL="0" indent="0">
+              <a:lnSpc>
+                <a:spcPct val="150000"/>
+              </a:lnSpc>
+              <a:buNone/>
+            </a:pPr>
+            <a:r>
+              <a:rPr lang="fr-FR" sz="3000" b="1" dirty="0">
+                <a:solidFill>
+                  <a:srgbClr val="004492"/>
+                </a:solidFill>
+                <a:latin typeface="Calibri (Corps)"/>
+              </a:rPr>
+              <a:t>Travaux complémentaires</a:t>
+            </a:r>
+          </a:p>
+        </p:txBody>
+      </p:sp>
+      <p:pic>
+        <p:nvPicPr>
+          <p:cNvPr id="4" name="Image 3"/>
+          <p:cNvPicPr>
+            <a:picLocks noChangeAspect="1"/>
+          </p:cNvPicPr>
+          <p:nvPr/>
+        </p:nvPicPr>
+        <p:blipFill>
+          <a:blip r:embed="rId2" cstate="print">
+            <a:extLst>
+              <a:ext uri="{28A0092B-C50C-407E-A947-70E740481C1C}">
+                <a14:useLocalDpi xmlns:a14="http://schemas.microsoft.com/office/drawing/2010/main" val="0"/>
+              </a:ext>
+            </a:extLst>
+          </a:blip>
+          <a:stretch>
+            <a:fillRect/>
+          </a:stretch>
+        </p:blipFill>
+        <p:spPr>
+          <a:xfrm>
+            <a:off x="5391615" y="4477372"/>
+            <a:ext cx="1778619" cy="1778619"/>
+          </a:xfrm>
+          <a:prstGeom prst="rect">
+            <a:avLst/>
+          </a:prstGeom>
+        </p:spPr>
+      </p:pic>
     </p:spTree>
     <p:extLst>
       <p:ext uri="{BB962C8B-B14F-4D97-AF65-F5344CB8AC3E}">
-        <p14:creationId xmlns:p14="http://schemas.microsoft.com/office/powerpoint/2010/main" val="152622507"/>
+        <p14:creationId xmlns:p14="http://schemas.microsoft.com/office/powerpoint/2010/main" val="2925390161"/>
       </p:ext>
     </p:extLst>
   </p:cSld>
@@ -15598,7 +16106,7 @@
         </p:nvSpPr>
         <p:spPr>
           <a:xfrm>
-            <a:off x="245917" y="10391"/>
+            <a:off x="255710" y="110750"/>
             <a:ext cx="6347713" cy="1320800"/>
           </a:xfrm>
         </p:spPr>
@@ -15609,34 +16117,363 @@
           <a:lstStyle/>
           <a:p>
             <a:r>
-              <a:rPr lang="fr-FR" sz="3500" dirty="0">
+              <a:rPr lang="fr-FR" sz="3800" dirty="0">
                 <a:solidFill>
                   <a:schemeClr val="bg1"/>
                 </a:solidFill>
-                <a:latin typeface="Eurostile" panose="020B0504020202050204" pitchFamily="34" charset="0"/>
+                <a:latin typeface="Eurostile-Roman" pitchFamily="2" charset="0"/>
               </a:rPr>
               <a:t>Bilan humain et</a:t>
             </a:r>
             <a:br>
-              <a:rPr lang="fr-FR" sz="3500" dirty="0">
+              <a:rPr lang="fr-FR" sz="3800" dirty="0">
                 <a:solidFill>
                   <a:schemeClr val="bg1"/>
                 </a:solidFill>
-                <a:latin typeface="Eurostile" panose="020B0504020202050204" pitchFamily="34" charset="0"/>
+                <a:latin typeface="Eurostile-Roman" pitchFamily="2" charset="0"/>
               </a:rPr>
             </a:br>
             <a:r>
-              <a:rPr lang="fr-FR" sz="3500" dirty="0">
+              <a:rPr lang="fr-FR" sz="3800" dirty="0">
                 <a:solidFill>
                   <a:schemeClr val="bg1"/>
                 </a:solidFill>
-                <a:latin typeface="Eurostile" panose="020B0504020202050204" pitchFamily="34" charset="0"/>
+                <a:latin typeface="Eurostile-Roman" pitchFamily="2" charset="0"/>
               </a:rPr>
               <a:t>technique</a:t>
             </a:r>
           </a:p>
         </p:txBody>
       </p:sp>
+      <p:sp>
+        <p:nvSpPr>
+          <p:cNvPr id="5" name="Espace réservé du contenu 30"/>
+          <p:cNvSpPr txBox="1">
+            <a:spLocks/>
+          </p:cNvSpPr>
+          <p:nvPr/>
+        </p:nvSpPr>
+        <p:spPr>
+          <a:xfrm>
+            <a:off x="1449848" y="1912280"/>
+            <a:ext cx="8359485" cy="3862981"/>
+          </a:xfrm>
+          <a:prstGeom prst="rect">
+            <a:avLst/>
+          </a:prstGeom>
+        </p:spPr>
+        <p:txBody>
+          <a:bodyPr vert="horz" lIns="91440" tIns="45720" rIns="91440" bIns="45720" rtlCol="0">
+            <a:normAutofit/>
+          </a:bodyPr>
+          <a:lstStyle>
+            <a:lvl1pPr marL="171450" indent="-171450" algn="l" defTabSz="685800" rtl="0" eaLnBrk="1" latinLnBrk="0" hangingPunct="1">
+              <a:lnSpc>
+                <a:spcPct val="90000"/>
+              </a:lnSpc>
+              <a:spcBef>
+                <a:spcPts val="750"/>
+              </a:spcBef>
+              <a:buFont typeface="Arial" panose="020B0604020202020204" pitchFamily="34" charset="0"/>
+              <a:buChar char="•"/>
+              <a:defRPr sz="2100" kern="1200">
+                <a:solidFill>
+                  <a:schemeClr val="tx1"/>
+                </a:solidFill>
+                <a:latin typeface="+mn-lt"/>
+                <a:ea typeface="+mn-ea"/>
+                <a:cs typeface="+mn-cs"/>
+              </a:defRPr>
+            </a:lvl1pPr>
+            <a:lvl2pPr marL="514350" indent="-171450" algn="l" defTabSz="685800" rtl="0" eaLnBrk="1" latinLnBrk="0" hangingPunct="1">
+              <a:lnSpc>
+                <a:spcPct val="90000"/>
+              </a:lnSpc>
+              <a:spcBef>
+                <a:spcPts val="375"/>
+              </a:spcBef>
+              <a:buFont typeface="Arial" panose="020B0604020202020204" pitchFamily="34" charset="0"/>
+              <a:buChar char="•"/>
+              <a:defRPr sz="1800" kern="1200">
+                <a:solidFill>
+                  <a:schemeClr val="tx1"/>
+                </a:solidFill>
+                <a:latin typeface="+mn-lt"/>
+                <a:ea typeface="+mn-ea"/>
+                <a:cs typeface="+mn-cs"/>
+              </a:defRPr>
+            </a:lvl2pPr>
+            <a:lvl3pPr marL="857250" indent="-171450" algn="l" defTabSz="685800" rtl="0" eaLnBrk="1" latinLnBrk="0" hangingPunct="1">
+              <a:lnSpc>
+                <a:spcPct val="90000"/>
+              </a:lnSpc>
+              <a:spcBef>
+                <a:spcPts val="375"/>
+              </a:spcBef>
+              <a:buFont typeface="Arial" panose="020B0604020202020204" pitchFamily="34" charset="0"/>
+              <a:buChar char="•"/>
+              <a:defRPr sz="1500" kern="1200">
+                <a:solidFill>
+                  <a:schemeClr val="tx1"/>
+                </a:solidFill>
+                <a:latin typeface="+mn-lt"/>
+                <a:ea typeface="+mn-ea"/>
+                <a:cs typeface="+mn-cs"/>
+              </a:defRPr>
+            </a:lvl3pPr>
+            <a:lvl4pPr marL="1200150" indent="-171450" algn="l" defTabSz="685800" rtl="0" eaLnBrk="1" latinLnBrk="0" hangingPunct="1">
+              <a:lnSpc>
+                <a:spcPct val="90000"/>
+              </a:lnSpc>
+              <a:spcBef>
+                <a:spcPts val="375"/>
+              </a:spcBef>
+              <a:buFont typeface="Arial" panose="020B0604020202020204" pitchFamily="34" charset="0"/>
+              <a:buChar char="•"/>
+              <a:defRPr sz="1350" kern="1200">
+                <a:solidFill>
+                  <a:schemeClr val="tx1"/>
+                </a:solidFill>
+                <a:latin typeface="+mn-lt"/>
+                <a:ea typeface="+mn-ea"/>
+                <a:cs typeface="+mn-cs"/>
+              </a:defRPr>
+            </a:lvl4pPr>
+            <a:lvl5pPr marL="1543050" indent="-171450" algn="l" defTabSz="685800" rtl="0" eaLnBrk="1" latinLnBrk="0" hangingPunct="1">
+              <a:lnSpc>
+                <a:spcPct val="90000"/>
+              </a:lnSpc>
+              <a:spcBef>
+                <a:spcPts val="375"/>
+              </a:spcBef>
+              <a:buFont typeface="Arial" panose="020B0604020202020204" pitchFamily="34" charset="0"/>
+              <a:buChar char="•"/>
+              <a:defRPr sz="1350" kern="1200">
+                <a:solidFill>
+                  <a:schemeClr val="tx1"/>
+                </a:solidFill>
+                <a:latin typeface="+mn-lt"/>
+                <a:ea typeface="+mn-ea"/>
+                <a:cs typeface="+mn-cs"/>
+              </a:defRPr>
+            </a:lvl5pPr>
+            <a:lvl6pPr marL="1885950" indent="-171450" algn="l" defTabSz="685800" rtl="0" eaLnBrk="1" latinLnBrk="0" hangingPunct="1">
+              <a:lnSpc>
+                <a:spcPct val="90000"/>
+              </a:lnSpc>
+              <a:spcBef>
+                <a:spcPts val="375"/>
+              </a:spcBef>
+              <a:buFont typeface="Arial" panose="020B0604020202020204" pitchFamily="34" charset="0"/>
+              <a:buChar char="•"/>
+              <a:defRPr sz="1350" kern="1200">
+                <a:solidFill>
+                  <a:schemeClr val="tx1"/>
+                </a:solidFill>
+                <a:latin typeface="+mn-lt"/>
+                <a:ea typeface="+mn-ea"/>
+                <a:cs typeface="+mn-cs"/>
+              </a:defRPr>
+            </a:lvl6pPr>
+            <a:lvl7pPr marL="2228850" indent="-171450" algn="l" defTabSz="685800" rtl="0" eaLnBrk="1" latinLnBrk="0" hangingPunct="1">
+              <a:lnSpc>
+                <a:spcPct val="90000"/>
+              </a:lnSpc>
+              <a:spcBef>
+                <a:spcPts val="375"/>
+              </a:spcBef>
+              <a:buFont typeface="Arial" panose="020B0604020202020204" pitchFamily="34" charset="0"/>
+              <a:buChar char="•"/>
+              <a:defRPr sz="1350" kern="1200">
+                <a:solidFill>
+                  <a:schemeClr val="tx1"/>
+                </a:solidFill>
+                <a:latin typeface="+mn-lt"/>
+                <a:ea typeface="+mn-ea"/>
+                <a:cs typeface="+mn-cs"/>
+              </a:defRPr>
+            </a:lvl7pPr>
+            <a:lvl8pPr marL="2571750" indent="-171450" algn="l" defTabSz="685800" rtl="0" eaLnBrk="1" latinLnBrk="0" hangingPunct="1">
+              <a:lnSpc>
+                <a:spcPct val="90000"/>
+              </a:lnSpc>
+              <a:spcBef>
+                <a:spcPts val="375"/>
+              </a:spcBef>
+              <a:buFont typeface="Arial" panose="020B0604020202020204" pitchFamily="34" charset="0"/>
+              <a:buChar char="•"/>
+              <a:defRPr sz="1350" kern="1200">
+                <a:solidFill>
+                  <a:schemeClr val="tx1"/>
+                </a:solidFill>
+                <a:latin typeface="+mn-lt"/>
+                <a:ea typeface="+mn-ea"/>
+                <a:cs typeface="+mn-cs"/>
+              </a:defRPr>
+            </a:lvl8pPr>
+            <a:lvl9pPr marL="2914650" indent="-171450" algn="l" defTabSz="685800" rtl="0" eaLnBrk="1" latinLnBrk="0" hangingPunct="1">
+              <a:lnSpc>
+                <a:spcPct val="90000"/>
+              </a:lnSpc>
+              <a:spcBef>
+                <a:spcPts val="375"/>
+              </a:spcBef>
+              <a:buFont typeface="Arial" panose="020B0604020202020204" pitchFamily="34" charset="0"/>
+              <a:buChar char="•"/>
+              <a:defRPr sz="1350" kern="1200">
+                <a:solidFill>
+                  <a:schemeClr val="tx1"/>
+                </a:solidFill>
+                <a:latin typeface="+mn-lt"/>
+                <a:ea typeface="+mn-ea"/>
+                <a:cs typeface="+mn-cs"/>
+              </a:defRPr>
+            </a:lvl9pPr>
+          </a:lstStyle>
+          <a:p>
+            <a:pPr>
+              <a:lnSpc>
+                <a:spcPct val="250000"/>
+              </a:lnSpc>
+              <a:buFont typeface="Wingdings" panose="05000000000000000000" pitchFamily="2" charset="2"/>
+              <a:buChar char="§"/>
+            </a:pPr>
+            <a:r>
+              <a:rPr lang="fr-FR" sz="2200" dirty="0">
+                <a:solidFill>
+                  <a:srgbClr val="004492"/>
+                </a:solidFill>
+                <a:latin typeface="Calibri (Corps)"/>
+              </a:rPr>
+              <a:t> Expérience très enrichissante et motivante</a:t>
+            </a:r>
+          </a:p>
+          <a:p>
+            <a:pPr>
+              <a:lnSpc>
+                <a:spcPct val="250000"/>
+              </a:lnSpc>
+              <a:buFont typeface="Wingdings" panose="05000000000000000000" pitchFamily="2" charset="2"/>
+              <a:buChar char="§"/>
+            </a:pPr>
+            <a:r>
+              <a:rPr lang="fr-FR" sz="2200" dirty="0">
+                <a:solidFill>
+                  <a:srgbClr val="004492"/>
+                </a:solidFill>
+                <a:latin typeface="Calibri (Corps)"/>
+              </a:rPr>
+              <a:t> Projet à la fois technique, complet et intéressant</a:t>
+            </a:r>
+          </a:p>
+          <a:p>
+            <a:pPr>
+              <a:lnSpc>
+                <a:spcPct val="250000"/>
+              </a:lnSpc>
+              <a:buFont typeface="Wingdings" panose="05000000000000000000" pitchFamily="2" charset="2"/>
+              <a:buChar char="§"/>
+            </a:pPr>
+            <a:r>
+              <a:rPr lang="fr-FR" sz="2200" dirty="0">
+                <a:solidFill>
+                  <a:srgbClr val="004492"/>
+                </a:solidFill>
+                <a:latin typeface="Calibri (Corps)"/>
+                <a:sym typeface="Wingdings" panose="05000000000000000000" pitchFamily="2" charset="2"/>
+              </a:rPr>
+              <a:t> Mise en place des compétences acquises en Licence</a:t>
+            </a:r>
+          </a:p>
+          <a:p>
+            <a:pPr>
+              <a:lnSpc>
+                <a:spcPct val="250000"/>
+              </a:lnSpc>
+              <a:buFont typeface="Wingdings" panose="05000000000000000000" pitchFamily="2" charset="2"/>
+              <a:buChar char="§"/>
+            </a:pPr>
+            <a:r>
+              <a:rPr lang="fr-FR" sz="2200" dirty="0">
+                <a:solidFill>
+                  <a:srgbClr val="004492"/>
+                </a:solidFill>
+                <a:latin typeface="Calibri (Corps)"/>
+                <a:sym typeface="Wingdings" panose="05000000000000000000" pitchFamily="2" charset="2"/>
+              </a:rPr>
+              <a:t> Découverte de technologies spécifiques </a:t>
+            </a:r>
+          </a:p>
+        </p:txBody>
+      </p:sp>
+      <p:sp>
+        <p:nvSpPr>
+          <p:cNvPr id="6" name="Espace réservé du numéro de diapositive 1"/>
+          <p:cNvSpPr>
+            <a:spLocks noGrp="1"/>
+          </p:cNvSpPr>
+          <p:nvPr>
+            <p:ph type="sldNum" sz="quarter" idx="12"/>
+          </p:nvPr>
+        </p:nvSpPr>
+        <p:spPr>
+          <a:xfrm>
+            <a:off x="6603423" y="6255991"/>
+            <a:ext cx="2057400" cy="365125"/>
+          </a:xfrm>
+        </p:spPr>
+        <p:txBody>
+          <a:bodyPr/>
+          <a:lstStyle/>
+          <a:p>
+            <a:r>
+              <a:rPr lang="fr-FR" sz="1800" dirty="0">
+                <a:latin typeface="Eurostile-Roman" pitchFamily="2" charset="0"/>
+              </a:rPr>
+              <a:t>Diapositive </a:t>
+            </a:r>
+            <a:fld id="{0A0AF257-D28F-495E-9E53-3BED59B8AA35}" type="slidenum">
+              <a:rPr lang="fr-FR" sz="1800" smtClean="0">
+                <a:latin typeface="Eurostile-Roman" pitchFamily="2" charset="0"/>
+              </a:rPr>
+              <a:t>31</a:t>
+            </a:fld>
+            <a:endParaRPr lang="fr-FR" sz="1800" dirty="0">
+              <a:latin typeface="Eurostile-Roman" pitchFamily="2" charset="0"/>
+            </a:endParaRPr>
+          </a:p>
+        </p:txBody>
+      </p:sp>
+    </p:spTree>
+    <p:extLst>
+      <p:ext uri="{BB962C8B-B14F-4D97-AF65-F5344CB8AC3E}">
+        <p14:creationId xmlns:p14="http://schemas.microsoft.com/office/powerpoint/2010/main" val="152622507"/>
+      </p:ext>
+    </p:extLst>
+  </p:cSld>
+  <p:clrMapOvr>
+    <a:masterClrMapping/>
+  </p:clrMapOvr>
+</p:sld>
+</file>
+
+<file path=ppt/slides/slide32.xml><?xml version="1.0" encoding="utf-8"?>
+<p:sld xmlns:a="http://schemas.openxmlformats.org/drawingml/2006/main" xmlns:r="http://schemas.openxmlformats.org/officeDocument/2006/relationships" xmlns:p="http://schemas.openxmlformats.org/presentationml/2006/main">
+  <p:cSld>
+    <p:spTree>
+      <p:nvGrpSpPr>
+        <p:cNvPr id="1" name=""/>
+        <p:cNvGrpSpPr/>
+        <p:nvPr/>
+      </p:nvGrpSpPr>
+      <p:grpSpPr>
+        <a:xfrm>
+          <a:off x="0" y="0"/>
+          <a:ext cx="0" cy="0"/>
+          <a:chOff x="0" y="0"/>
+          <a:chExt cx="0" cy="0"/>
+        </a:xfrm>
+      </p:grpSpPr>
       <p:sp>
         <p:nvSpPr>
           <p:cNvPr id="5" name="Espace réservé du contenu 30"/>
@@ -15835,9 +16672,9 @@
                 <a:solidFill>
                   <a:srgbClr val="004492"/>
                 </a:solidFill>
-                <a:latin typeface="Eurostile" panose="020B0504020202050204" pitchFamily="34" charset="0"/>
-              </a:rPr>
-              <a:t> Stage de 10 semaines : atout pour le parcours professionnel</a:t>
+                <a:latin typeface="Calibri (Corps)"/>
+              </a:rPr>
+              <a:t> Stage de 8 semaines : atout pour le parcours professionnel</a:t>
             </a:r>
           </a:p>
           <a:p>
@@ -15853,10 +16690,10 @@
                 <a:solidFill>
                   <a:srgbClr val="004492"/>
                 </a:solidFill>
-                <a:latin typeface="Eurostile" panose="020B0504020202050204" pitchFamily="34" charset="0"/>
+                <a:latin typeface="Calibri (Corps)"/>
                 <a:sym typeface="Wingdings" panose="05000000000000000000" pitchFamily="2" charset="2"/>
               </a:rPr>
-              <a:t> Premier pas dans le monde professionnel</a:t>
+              <a:t> Expérience supplémentaire dans le monde professionnel</a:t>
             </a:r>
           </a:p>
           <a:p>
@@ -15872,10 +16709,10 @@
                 <a:solidFill>
                   <a:srgbClr val="004492"/>
                 </a:solidFill>
-                <a:latin typeface="Eurostile" panose="020B0504020202050204" pitchFamily="34" charset="0"/>
+                <a:latin typeface="Calibri (Corps)"/>
                 <a:sym typeface="Wingdings" panose="05000000000000000000" pitchFamily="2" charset="2"/>
               </a:rPr>
-              <a:t> Me conforte dans mon envie de me diriger vers les métiers du développement de projets informatiques</a:t>
+              <a:t> Me conforte dans mon envie de me diriger vers les métiers du développement logiciel</a:t>
             </a:r>
           </a:p>
           <a:p>
@@ -15890,7 +16727,7 @@
               <a:solidFill>
                 <a:srgbClr val="004492"/>
               </a:solidFill>
-              <a:latin typeface="Eurostile" panose="020B0504020202050204" pitchFamily="34" charset="0"/>
+              <a:latin typeface="Calibri (Corps)"/>
               <a:sym typeface="Wingdings" panose="05000000000000000000" pitchFamily="2" charset="2"/>
             </a:endParaRPr>
           </a:p>
@@ -15898,7 +16735,7 @@
       </p:sp>
       <p:sp>
         <p:nvSpPr>
-          <p:cNvPr id="3" name="Espace réservé du numéro de diapositive 2"/>
+          <p:cNvPr id="7" name="Espace réservé du numéro de diapositive 1"/>
           <p:cNvSpPr>
             <a:spLocks noGrp="1"/>
           </p:cNvSpPr>
@@ -15906,16 +16743,82 @@
             <p:ph type="sldNum" sz="quarter" idx="12"/>
           </p:nvPr>
         </p:nvSpPr>
-        <p:spPr/>
+        <p:spPr>
+          <a:xfrm>
+            <a:off x="6603423" y="6255991"/>
+            <a:ext cx="2057400" cy="365125"/>
+          </a:xfrm>
+        </p:spPr>
         <p:txBody>
           <a:bodyPr/>
           <a:lstStyle/>
           <a:p>
+            <a:r>
+              <a:rPr lang="fr-FR" sz="1800" dirty="0">
+                <a:latin typeface="Eurostile-Roman" pitchFamily="2" charset="0"/>
+              </a:rPr>
+              <a:t>Diapositive </a:t>
+            </a:r>
             <a:fld id="{0A0AF257-D28F-495E-9E53-3BED59B8AA35}" type="slidenum">
-              <a:rPr lang="fr-FR" smtClean="0"/>
-              <a:t>31</a:t>
+              <a:rPr lang="fr-FR" sz="1800" smtClean="0">
+                <a:latin typeface="Eurostile-Roman" pitchFamily="2" charset="0"/>
+              </a:rPr>
+              <a:t>32</a:t>
             </a:fld>
-            <a:endParaRPr lang="fr-FR"/>
+            <a:endParaRPr lang="fr-FR" sz="1800" dirty="0">
+              <a:latin typeface="Eurostile-Roman" pitchFamily="2" charset="0"/>
+            </a:endParaRPr>
+          </a:p>
+        </p:txBody>
+      </p:sp>
+      <p:sp>
+        <p:nvSpPr>
+          <p:cNvPr id="8" name="Titre 1"/>
+          <p:cNvSpPr>
+            <a:spLocks noGrp="1"/>
+          </p:cNvSpPr>
+          <p:nvPr>
+            <p:ph type="title"/>
+          </p:nvPr>
+        </p:nvSpPr>
+        <p:spPr>
+          <a:xfrm>
+            <a:off x="255710" y="110750"/>
+            <a:ext cx="6347713" cy="1320800"/>
+          </a:xfrm>
+        </p:spPr>
+        <p:txBody>
+          <a:bodyPr>
+            <a:normAutofit/>
+          </a:bodyPr>
+          <a:lstStyle/>
+          <a:p>
+            <a:r>
+              <a:rPr lang="fr-FR" sz="3800" dirty="0">
+                <a:solidFill>
+                  <a:schemeClr val="bg1"/>
+                </a:solidFill>
+                <a:latin typeface="Eurostile-Roman" pitchFamily="2" charset="0"/>
+              </a:rPr>
+              <a:t>Bilan humain et</a:t>
+            </a:r>
+            <a:br>
+              <a:rPr lang="fr-FR" sz="3800" dirty="0">
+                <a:solidFill>
+                  <a:schemeClr val="bg1"/>
+                </a:solidFill>
+                <a:latin typeface="Eurostile-Roman" pitchFamily="2" charset="0"/>
+              </a:rPr>
+            </a:br>
+            <a:r>
+              <a:rPr lang="fr-FR" sz="3800" dirty="0">
+                <a:solidFill>
+                  <a:schemeClr val="bg1"/>
+                </a:solidFill>
+                <a:latin typeface="Eurostile-Roman" pitchFamily="2" charset="0"/>
+              </a:rPr>
+              <a:t>technique</a:t>
+            </a:r>
           </a:p>
         </p:txBody>
       </p:sp>
@@ -15932,7 +16835,7 @@
 </p:sld>
 </file>
 
-<file path=ppt/slides/slide32.xml><?xml version="1.0" encoding="utf-8"?>
+<file path=ppt/slides/slide33.xml><?xml version="1.0" encoding="utf-8"?>
 <p:sld xmlns:a="http://schemas.openxmlformats.org/drawingml/2006/main" xmlns:r="http://schemas.openxmlformats.org/officeDocument/2006/relationships" xmlns:p="http://schemas.openxmlformats.org/presentationml/2006/main">
   <p:cSld>
     <p:spTree>
@@ -16146,7 +17049,7 @@
                 <a:solidFill>
                   <a:srgbClr val="004492"/>
                 </a:solidFill>
-                <a:latin typeface="Eurostile" panose="020B0504020202050204" pitchFamily="34" charset="0"/>
+                <a:latin typeface="Eurostile-Roman" pitchFamily="2" charset="0"/>
               </a:rPr>
               <a:t>Merci de votre attention</a:t>
             </a:r>
@@ -16154,7 +17057,7 @@
               <a:solidFill>
                 <a:srgbClr val="004492"/>
               </a:solidFill>
-              <a:latin typeface="Eurostile" panose="020B0504020202050204" pitchFamily="34" charset="0"/>
+              <a:latin typeface="Eurostile-Roman" pitchFamily="2" charset="0"/>
               <a:sym typeface="Wingdings" panose="05000000000000000000" pitchFamily="2" charset="2"/>
             </a:endParaRPr>
           </a:p>
@@ -16177,7 +17080,7 @@
           <a:p>
             <a:fld id="{0A0AF257-D28F-495E-9E53-3BED59B8AA35}" type="slidenum">
               <a:rPr lang="fr-FR" smtClean="0"/>
-              <a:t>32</a:t>
+              <a:t>33</a:t>
             </a:fld>
             <a:endParaRPr lang="fr-FR"/>
           </a:p>

</xml_diff>